<commit_message>
Removed useless search page
</commit_message>
<xml_diff>
--- a/docs/ehrsfm-tool-fhir_JAN2025.pptx
+++ b/docs/ehrsfm-tool-fhir_JAN2025.pptx
@@ -70,7 +70,7 @@
         <p:txBody>
           <a:bodyPr/>
           <a:p>
-            <a:fld id="{B85C311C-4DE8-400D-9018-742F4413895C}" type="slidenum">
+            <a:fld id="{4EE66B8D-B48A-4B95-B45C-03C9B0ED4A29}" type="slidenum">
               <a:t>&lt;#&gt;</a:t>
             </a:fld>
           </a:p>
@@ -121,7 +121,7 @@
       </p:grpSpPr>
       <p:sp>
         <p:nvSpPr>
-          <p:cNvPr id="10" name="PlaceHolder 1"/>
+          <p:cNvPr id="8" name="PlaceHolder 1"/>
           <p:cNvSpPr>
             <a:spLocks noGrp="1"/>
           </p:cNvSpPr>
@@ -132,7 +132,7 @@
         <p:spPr>
           <a:xfrm>
             <a:off x="504000" y="226080"/>
-            <a:ext cx="9071280" cy="946080"/>
+            <a:ext cx="9070920" cy="945720"/>
           </a:xfrm>
           <a:prstGeom prst="rect">
             <a:avLst/>
@@ -161,7 +161,7 @@
       </p:sp>
       <p:sp>
         <p:nvSpPr>
-          <p:cNvPr id="11" name="PlaceHolder 2"/>
+          <p:cNvPr id="9" name="PlaceHolder 2"/>
           <p:cNvSpPr>
             <a:spLocks noGrp="1"/>
           </p:cNvSpPr>
@@ -172,7 +172,7 @@
         <p:spPr>
           <a:xfrm>
             <a:off x="504000" y="1326600"/>
-            <a:ext cx="9071280" cy="3287880"/>
+            <a:ext cx="9070920" cy="3287520"/>
           </a:xfrm>
           <a:prstGeom prst="rect">
             <a:avLst/>
@@ -236,7 +236,7 @@
         <p:txBody>
           <a:bodyPr/>
           <a:p>
-            <a:fld id="{D09F66CB-0F34-41E1-835D-833BD2C8AEFE}" type="slidenum">
+            <a:fld id="{432B45B3-5024-4EC0-B0C8-8AEBC3DD8E68}" type="slidenum">
               <a:t>&lt;#&gt;</a:t>
             </a:fld>
           </a:p>
@@ -287,7 +287,7 @@
       </p:grpSpPr>
       <p:sp>
         <p:nvSpPr>
-          <p:cNvPr id="17" name="PlaceHolder 1"/>
+          <p:cNvPr id="14" name="PlaceHolder 1"/>
           <p:cNvSpPr>
             <a:spLocks noGrp="1"/>
           </p:cNvSpPr>
@@ -298,7 +298,7 @@
         <p:spPr>
           <a:xfrm>
             <a:off x="504000" y="226080"/>
-            <a:ext cx="9071280" cy="946080"/>
+            <a:ext cx="9070920" cy="945720"/>
           </a:xfrm>
           <a:prstGeom prst="rect">
             <a:avLst/>
@@ -359,7 +359,7 @@
         <p:txBody>
           <a:bodyPr/>
           <a:p>
-            <a:fld id="{4845DFF6-275D-4D62-AA7F-40098C1EA09F}" type="slidenum">
+            <a:fld id="{7C9395D0-69D7-4737-9845-6276A1B48BFE}" type="slidenum">
               <a:t>&lt;#&gt;</a:t>
             </a:fld>
           </a:p>
@@ -442,7 +442,7 @@
         <p:txBody>
           <a:bodyPr/>
           <a:p>
-            <a:fld id="{370D4DE9-8C20-4692-B004-E1ADEA10903A}" type="slidenum">
+            <a:fld id="{A88B880A-4EDE-4149-AC00-8C13323752B3}" type="slidenum">
               <a:t>&lt;#&gt;</a:t>
             </a:fld>
           </a:p>
@@ -504,7 +504,7 @@
         <p:spPr>
           <a:xfrm>
             <a:off x="3447360" y="5165280"/>
-            <a:ext cx="3194640" cy="390240"/>
+            <a:ext cx="3194280" cy="389880"/>
           </a:xfrm>
           <a:prstGeom prst="rect">
             <a:avLst/>
@@ -576,7 +576,7 @@
         <p:spPr>
           <a:xfrm>
             <a:off x="7227360" y="5165280"/>
-            <a:ext cx="2347920" cy="390240"/>
+            <a:ext cx="2347560" cy="389880"/>
           </a:xfrm>
           <a:prstGeom prst="rect">
             <a:avLst/>
@@ -617,7 +617,7 @@
                 <a:tab algn="l" pos="0"/>
               </a:tabLst>
             </a:pPr>
-            <a:fld id="{71DD5E34-1A56-4629-8CA2-100CC518CA2D}" type="slidenum">
+            <a:fld id="{3A3CA51A-B6C3-45BC-9F99-4B632B67946C}" type="slidenum">
               <a:rPr b="0" lang="en-US" sz="1400" spc="-1" strike="noStrike">
                 <a:solidFill>
                   <a:srgbClr val="000000"/>
@@ -648,7 +648,7 @@
         <p:spPr>
           <a:xfrm>
             <a:off x="504000" y="5165280"/>
-            <a:ext cx="2347920" cy="390240"/>
+            <a:ext cx="2347560" cy="389880"/>
           </a:xfrm>
           <a:prstGeom prst="rect">
             <a:avLst/>
@@ -691,280 +691,6 @@
                 <a:srgbClr val="000000"/>
               </a:solidFill>
               <a:latin typeface="Times New Roman"/>
-            </a:endParaRPr>
-          </a:p>
-        </p:txBody>
-      </p:sp>
-      <p:sp>
-        <p:nvSpPr>
-          <p:cNvPr id="3" name="PlaceHolder 4"/>
-          <p:cNvSpPr>
-            <a:spLocks noGrp="1"/>
-          </p:cNvSpPr>
-          <p:nvPr>
-            <p:ph type="title"/>
-          </p:nvPr>
-        </p:nvSpPr>
-        <p:spPr>
-          <a:xfrm>
-            <a:off x="504000" y="226080"/>
-            <a:ext cx="9072000" cy="946440"/>
-          </a:xfrm>
-          <a:prstGeom prst="rect">
-            <a:avLst/>
-          </a:prstGeom>
-          <a:noFill/>
-          <a:ln w="0">
-            <a:noFill/>
-          </a:ln>
-        </p:spPr>
-        <p:txBody>
-          <a:bodyPr lIns="0" rIns="0" tIns="0" bIns="0" anchor="ctr">
-            <a:noAutofit/>
-          </a:bodyPr>
-          <a:p>
-            <a:pPr indent="0" algn="ctr">
-              <a:buNone/>
-            </a:pPr>
-            <a:r>
-              <a:rPr b="0" lang="en-US" sz="4400" spc="-1" strike="noStrike">
-                <a:solidFill>
-                  <a:srgbClr val="000000"/>
-                </a:solidFill>
-                <a:latin typeface="Arial"/>
-              </a:rPr>
-              <a:t>Click to edit the title text format</a:t>
-            </a:r>
-            <a:endParaRPr b="0" lang="en-US" sz="4400" spc="-1" strike="noStrike">
-              <a:solidFill>
-                <a:srgbClr val="000000"/>
-              </a:solidFill>
-              <a:latin typeface="Arial"/>
-            </a:endParaRPr>
-          </a:p>
-        </p:txBody>
-      </p:sp>
-      <p:sp>
-        <p:nvSpPr>
-          <p:cNvPr id="4" name="PlaceHolder 5"/>
-          <p:cNvSpPr>
-            <a:spLocks noGrp="1"/>
-          </p:cNvSpPr>
-          <p:nvPr>
-            <p:ph type="body"/>
-          </p:nvPr>
-        </p:nvSpPr>
-        <p:spPr>
-          <a:xfrm>
-            <a:off x="504000" y="1326600"/>
-            <a:ext cx="9072000" cy="3288600"/>
-          </a:xfrm>
-          <a:prstGeom prst="rect">
-            <a:avLst/>
-          </a:prstGeom>
-          <a:noFill/>
-          <a:ln w="0">
-            <a:noFill/>
-          </a:ln>
-        </p:spPr>
-        <p:txBody>
-          <a:bodyPr lIns="0" rIns="0" tIns="0" bIns="0" anchor="t">
-            <a:normAutofit/>
-          </a:bodyPr>
-          <a:p>
-            <a:pPr marL="432000" indent="-324000">
-              <a:spcBef>
-                <a:spcPts val="1417"/>
-              </a:spcBef>
-              <a:buClr>
-                <a:srgbClr val="000000"/>
-              </a:buClr>
-              <a:buSzPct val="45000"/>
-              <a:buFont typeface="Wingdings" charset="2"/>
-              <a:buChar char=""/>
-            </a:pPr>
-            <a:r>
-              <a:rPr b="0" lang="en-US" sz="3200" spc="-1" strike="noStrike">
-                <a:solidFill>
-                  <a:srgbClr val="000000"/>
-                </a:solidFill>
-                <a:latin typeface="Arial"/>
-              </a:rPr>
-              <a:t>Click to edit the outline text format</a:t>
-            </a:r>
-            <a:endParaRPr b="0" lang="en-US" sz="3200" spc="-1" strike="noStrike">
-              <a:solidFill>
-                <a:srgbClr val="000000"/>
-              </a:solidFill>
-              <a:latin typeface="Arial"/>
-            </a:endParaRPr>
-          </a:p>
-          <a:p>
-            <a:pPr lvl="1" marL="864000" indent="-324000">
-              <a:spcBef>
-                <a:spcPts val="1134"/>
-              </a:spcBef>
-              <a:buClr>
-                <a:srgbClr val="000000"/>
-              </a:buClr>
-              <a:buSzPct val="75000"/>
-              <a:buFont typeface="Symbol" charset="2"/>
-              <a:buChar char=""/>
-            </a:pPr>
-            <a:r>
-              <a:rPr b="0" lang="en-US" sz="2800" spc="-1" strike="noStrike">
-                <a:solidFill>
-                  <a:srgbClr val="000000"/>
-                </a:solidFill>
-                <a:latin typeface="Arial"/>
-              </a:rPr>
-              <a:t>Second Outline Level</a:t>
-            </a:r>
-            <a:endParaRPr b="0" lang="en-US" sz="2800" spc="-1" strike="noStrike">
-              <a:solidFill>
-                <a:srgbClr val="000000"/>
-              </a:solidFill>
-              <a:latin typeface="Arial"/>
-            </a:endParaRPr>
-          </a:p>
-          <a:p>
-            <a:pPr lvl="2" marL="1296000" indent="-288000">
-              <a:spcBef>
-                <a:spcPts val="850"/>
-              </a:spcBef>
-              <a:buClr>
-                <a:srgbClr val="000000"/>
-              </a:buClr>
-              <a:buSzPct val="45000"/>
-              <a:buFont typeface="Wingdings" charset="2"/>
-              <a:buChar char=""/>
-            </a:pPr>
-            <a:r>
-              <a:rPr b="0" lang="en-US" sz="2400" spc="-1" strike="noStrike">
-                <a:solidFill>
-                  <a:srgbClr val="000000"/>
-                </a:solidFill>
-                <a:latin typeface="Arial"/>
-              </a:rPr>
-              <a:t>Third Outline Level</a:t>
-            </a:r>
-            <a:endParaRPr b="0" lang="en-US" sz="2400" spc="-1" strike="noStrike">
-              <a:solidFill>
-                <a:srgbClr val="000000"/>
-              </a:solidFill>
-              <a:latin typeface="Arial"/>
-            </a:endParaRPr>
-          </a:p>
-          <a:p>
-            <a:pPr lvl="3" marL="1728000" indent="-216000">
-              <a:spcBef>
-                <a:spcPts val="567"/>
-              </a:spcBef>
-              <a:buClr>
-                <a:srgbClr val="000000"/>
-              </a:buClr>
-              <a:buSzPct val="75000"/>
-              <a:buFont typeface="Symbol" charset="2"/>
-              <a:buChar char=""/>
-            </a:pPr>
-            <a:r>
-              <a:rPr b="0" lang="en-US" sz="2000" spc="-1" strike="noStrike">
-                <a:solidFill>
-                  <a:srgbClr val="000000"/>
-                </a:solidFill>
-                <a:latin typeface="Arial"/>
-              </a:rPr>
-              <a:t>Fourth Outline Level</a:t>
-            </a:r>
-            <a:endParaRPr b="0" lang="en-US" sz="2000" spc="-1" strike="noStrike">
-              <a:solidFill>
-                <a:srgbClr val="000000"/>
-              </a:solidFill>
-              <a:latin typeface="Arial"/>
-            </a:endParaRPr>
-          </a:p>
-          <a:p>
-            <a:pPr lvl="4" marL="2160000" indent="-216000">
-              <a:spcBef>
-                <a:spcPts val="283"/>
-              </a:spcBef>
-              <a:buClr>
-                <a:srgbClr val="000000"/>
-              </a:buClr>
-              <a:buSzPct val="45000"/>
-              <a:buFont typeface="Wingdings" charset="2"/>
-              <a:buChar char=""/>
-            </a:pPr>
-            <a:r>
-              <a:rPr b="0" lang="en-US" sz="2000" spc="-1" strike="noStrike">
-                <a:solidFill>
-                  <a:srgbClr val="000000"/>
-                </a:solidFill>
-                <a:latin typeface="Arial"/>
-              </a:rPr>
-              <a:t>Fifth Outline Level</a:t>
-            </a:r>
-            <a:endParaRPr b="0" lang="en-US" sz="2000" spc="-1" strike="noStrike">
-              <a:solidFill>
-                <a:srgbClr val="000000"/>
-              </a:solidFill>
-              <a:latin typeface="Arial"/>
-            </a:endParaRPr>
-          </a:p>
-          <a:p>
-            <a:pPr lvl="5" marL="2592000" indent="-216000">
-              <a:spcBef>
-                <a:spcPts val="283"/>
-              </a:spcBef>
-              <a:buClr>
-                <a:srgbClr val="000000"/>
-              </a:buClr>
-              <a:buSzPct val="45000"/>
-              <a:buFont typeface="Wingdings" charset="2"/>
-              <a:buChar char=""/>
-            </a:pPr>
-            <a:r>
-              <a:rPr b="0" lang="en-US" sz="2000" spc="-1" strike="noStrike">
-                <a:solidFill>
-                  <a:srgbClr val="000000"/>
-                </a:solidFill>
-                <a:latin typeface="Arial"/>
-              </a:rPr>
-              <a:t>Sixth Outline Level</a:t>
-            </a:r>
-            <a:endParaRPr b="0" lang="en-US" sz="2000" spc="-1" strike="noStrike">
-              <a:solidFill>
-                <a:srgbClr val="000000"/>
-              </a:solidFill>
-              <a:latin typeface="Arial"/>
-            </a:endParaRPr>
-          </a:p>
-          <a:p>
-            <a:pPr lvl="6" marL="3024000" indent="-216000">
-              <a:spcBef>
-                <a:spcPts val="283"/>
-              </a:spcBef>
-              <a:buClr>
-                <a:srgbClr val="000000"/>
-              </a:buClr>
-              <a:buSzPct val="45000"/>
-              <a:buFont typeface="Wingdings" charset="2"/>
-              <a:buChar char=""/>
-            </a:pPr>
-            <a:r>
-              <a:rPr b="0" lang="en-US" sz="2000" spc="-1" strike="noStrike">
-                <a:solidFill>
-                  <a:srgbClr val="000000"/>
-                </a:solidFill>
-                <a:latin typeface="Arial"/>
-              </a:rPr>
-              <a:t>Seventh Outline Level</a:t>
-            </a:r>
-            <a:endParaRPr b="0" lang="en-US" sz="2000" spc="-1" strike="noStrike">
-              <a:solidFill>
-                <a:srgbClr val="000000"/>
-              </a:solidFill>
-              <a:latin typeface="Arial"/>
             </a:endParaRPr>
           </a:p>
         </p:txBody>
@@ -997,7 +723,7 @@
       </p:grpSpPr>
       <p:sp>
         <p:nvSpPr>
-          <p:cNvPr id="5" name="PlaceHolder 1"/>
+          <p:cNvPr id="3" name="PlaceHolder 1"/>
           <p:cNvSpPr>
             <a:spLocks noGrp="1"/>
           </p:cNvSpPr>
@@ -1008,7 +734,7 @@
         <p:spPr>
           <a:xfrm>
             <a:off x="504000" y="226080"/>
-            <a:ext cx="9071280" cy="946080"/>
+            <a:ext cx="9070920" cy="945720"/>
           </a:xfrm>
           <a:prstGeom prst="rect">
             <a:avLst/>
@@ -1046,7 +772,7 @@
       </p:sp>
       <p:sp>
         <p:nvSpPr>
-          <p:cNvPr id="6" name="PlaceHolder 2"/>
+          <p:cNvPr id="4" name="PlaceHolder 2"/>
           <p:cNvSpPr>
             <a:spLocks noGrp="1"/>
           </p:cNvSpPr>
@@ -1057,7 +783,7 @@
         <p:spPr>
           <a:xfrm>
             <a:off x="504000" y="1326600"/>
-            <a:ext cx="9071280" cy="3287880"/>
+            <a:ext cx="9070920" cy="3287520"/>
           </a:xfrm>
           <a:prstGeom prst="rect">
             <a:avLst/>
@@ -1271,7 +997,7 @@
       </p:sp>
       <p:sp>
         <p:nvSpPr>
-          <p:cNvPr id="7" name="PlaceHolder 3"/>
+          <p:cNvPr id="5" name="PlaceHolder 3"/>
           <p:cNvSpPr>
             <a:spLocks noGrp="1"/>
           </p:cNvSpPr>
@@ -1282,7 +1008,7 @@
         <p:spPr>
           <a:xfrm>
             <a:off x="3447360" y="5165280"/>
-            <a:ext cx="3194640" cy="390240"/>
+            <a:ext cx="3194280" cy="389880"/>
           </a:xfrm>
           <a:prstGeom prst="rect">
             <a:avLst/>
@@ -1343,7 +1069,7 @@
       </p:sp>
       <p:sp>
         <p:nvSpPr>
-          <p:cNvPr id="8" name="PlaceHolder 4"/>
+          <p:cNvPr id="6" name="PlaceHolder 4"/>
           <p:cNvSpPr>
             <a:spLocks noGrp="1"/>
           </p:cNvSpPr>
@@ -1354,7 +1080,7 @@
         <p:spPr>
           <a:xfrm>
             <a:off x="7227360" y="5165280"/>
-            <a:ext cx="2347920" cy="390240"/>
+            <a:ext cx="2347560" cy="389880"/>
           </a:xfrm>
           <a:prstGeom prst="rect">
             <a:avLst/>
@@ -1395,7 +1121,7 @@
                 <a:tab algn="l" pos="0"/>
               </a:tabLst>
             </a:pPr>
-            <a:fld id="{D4A435C3-4005-4A5C-BB17-0930C252B655}" type="slidenum">
+            <a:fld id="{A9C52A11-55D6-44B5-97D6-F18457176C64}" type="slidenum">
               <a:rPr b="0" lang="en-US" sz="1400" spc="-1" strike="noStrike">
                 <a:solidFill>
                   <a:srgbClr val="000000"/>
@@ -1415,7 +1141,7 @@
       </p:sp>
       <p:sp>
         <p:nvSpPr>
-          <p:cNvPr id="9" name="PlaceHolder 5"/>
+          <p:cNvPr id="7" name="PlaceHolder 5"/>
           <p:cNvSpPr>
             <a:spLocks noGrp="1"/>
           </p:cNvSpPr>
@@ -1426,7 +1152,7 @@
         <p:spPr>
           <a:xfrm>
             <a:off x="504000" y="5165280"/>
-            <a:ext cx="2347920" cy="390240"/>
+            <a:ext cx="2347560" cy="389880"/>
           </a:xfrm>
           <a:prstGeom prst="rect">
             <a:avLst/>
@@ -1501,7 +1227,7 @@
       </p:grpSpPr>
       <p:sp>
         <p:nvSpPr>
-          <p:cNvPr id="12" name="PlaceHolder 1"/>
+          <p:cNvPr id="10" name="PlaceHolder 1"/>
           <p:cNvSpPr>
             <a:spLocks noGrp="1"/>
           </p:cNvSpPr>
@@ -1512,7 +1238,7 @@
         <p:spPr>
           <a:xfrm>
             <a:off x="504000" y="226080"/>
-            <a:ext cx="9071280" cy="946080"/>
+            <a:ext cx="9070920" cy="945720"/>
           </a:xfrm>
           <a:prstGeom prst="rect">
             <a:avLst/>
@@ -1550,7 +1276,7 @@
       </p:sp>
       <p:sp>
         <p:nvSpPr>
-          <p:cNvPr id="13" name="PlaceHolder 2"/>
+          <p:cNvPr id="11" name="PlaceHolder 2"/>
           <p:cNvSpPr>
             <a:spLocks noGrp="1"/>
           </p:cNvSpPr>
@@ -1561,7 +1287,7 @@
         <p:spPr>
           <a:xfrm>
             <a:off x="3447360" y="5165280"/>
-            <a:ext cx="3194640" cy="390240"/>
+            <a:ext cx="3194280" cy="389880"/>
           </a:xfrm>
           <a:prstGeom prst="rect">
             <a:avLst/>
@@ -1622,7 +1348,7 @@
       </p:sp>
       <p:sp>
         <p:nvSpPr>
-          <p:cNvPr id="14" name="PlaceHolder 3"/>
+          <p:cNvPr id="12" name="PlaceHolder 3"/>
           <p:cNvSpPr>
             <a:spLocks noGrp="1"/>
           </p:cNvSpPr>
@@ -1633,7 +1359,7 @@
         <p:spPr>
           <a:xfrm>
             <a:off x="7227360" y="5165280"/>
-            <a:ext cx="2347920" cy="390240"/>
+            <a:ext cx="2347560" cy="389880"/>
           </a:xfrm>
           <a:prstGeom prst="rect">
             <a:avLst/>
@@ -1674,7 +1400,7 @@
                 <a:tab algn="l" pos="0"/>
               </a:tabLst>
             </a:pPr>
-            <a:fld id="{19A210C6-E30E-435E-B4A8-F7565473A1D9}" type="slidenum">
+            <a:fld id="{122CC0CD-BDEA-418B-A69F-34B71EAC575D}" type="slidenum">
               <a:rPr b="0" lang="en-US" sz="1400" spc="-1" strike="noStrike">
                 <a:solidFill>
                   <a:srgbClr val="000000"/>
@@ -1694,7 +1420,7 @@
       </p:sp>
       <p:sp>
         <p:nvSpPr>
-          <p:cNvPr id="15" name="PlaceHolder 4"/>
+          <p:cNvPr id="13" name="PlaceHolder 4"/>
           <p:cNvSpPr>
             <a:spLocks noGrp="1"/>
           </p:cNvSpPr>
@@ -1705,7 +1431,7 @@
         <p:spPr>
           <a:xfrm>
             <a:off x="504000" y="5165280"/>
-            <a:ext cx="2347920" cy="390240"/>
+            <a:ext cx="2347560" cy="389880"/>
           </a:xfrm>
           <a:prstGeom prst="rect">
             <a:avLst/>
@@ -1748,231 +1474,6 @@
                 <a:srgbClr val="000000"/>
               </a:solidFill>
               <a:latin typeface="Times New Roman"/>
-            </a:endParaRPr>
-          </a:p>
-        </p:txBody>
-      </p:sp>
-      <p:sp>
-        <p:nvSpPr>
-          <p:cNvPr id="16" name="PlaceHolder 5"/>
-          <p:cNvSpPr>
-            <a:spLocks noGrp="1"/>
-          </p:cNvSpPr>
-          <p:nvPr>
-            <p:ph type="body"/>
-          </p:nvPr>
-        </p:nvSpPr>
-        <p:spPr>
-          <a:xfrm>
-            <a:off x="504000" y="1326600"/>
-            <a:ext cx="9072000" cy="3288600"/>
-          </a:xfrm>
-          <a:prstGeom prst="rect">
-            <a:avLst/>
-          </a:prstGeom>
-          <a:noFill/>
-          <a:ln w="0">
-            <a:noFill/>
-          </a:ln>
-        </p:spPr>
-        <p:txBody>
-          <a:bodyPr lIns="0" rIns="0" tIns="0" bIns="0" anchor="t">
-            <a:normAutofit/>
-          </a:bodyPr>
-          <a:p>
-            <a:pPr marL="432000" indent="-324000">
-              <a:spcBef>
-                <a:spcPts val="1417"/>
-              </a:spcBef>
-              <a:buClr>
-                <a:srgbClr val="000000"/>
-              </a:buClr>
-              <a:buSzPct val="45000"/>
-              <a:buFont typeface="Wingdings" charset="2"/>
-              <a:buChar char=""/>
-            </a:pPr>
-            <a:r>
-              <a:rPr b="0" lang="en-US" sz="3200" spc="-1" strike="noStrike">
-                <a:solidFill>
-                  <a:srgbClr val="000000"/>
-                </a:solidFill>
-                <a:latin typeface="Arial"/>
-              </a:rPr>
-              <a:t>Click to edit the outline text format</a:t>
-            </a:r>
-            <a:endParaRPr b="0" lang="en-US" sz="3200" spc="-1" strike="noStrike">
-              <a:solidFill>
-                <a:srgbClr val="000000"/>
-              </a:solidFill>
-              <a:latin typeface="Arial"/>
-            </a:endParaRPr>
-          </a:p>
-          <a:p>
-            <a:pPr lvl="1" marL="864000" indent="-324000">
-              <a:spcBef>
-                <a:spcPts val="1134"/>
-              </a:spcBef>
-              <a:buClr>
-                <a:srgbClr val="000000"/>
-              </a:buClr>
-              <a:buSzPct val="75000"/>
-              <a:buFont typeface="Symbol" charset="2"/>
-              <a:buChar char=""/>
-            </a:pPr>
-            <a:r>
-              <a:rPr b="0" lang="en-US" sz="2800" spc="-1" strike="noStrike">
-                <a:solidFill>
-                  <a:srgbClr val="000000"/>
-                </a:solidFill>
-                <a:latin typeface="Arial"/>
-              </a:rPr>
-              <a:t>Second Outline Level</a:t>
-            </a:r>
-            <a:endParaRPr b="0" lang="en-US" sz="2800" spc="-1" strike="noStrike">
-              <a:solidFill>
-                <a:srgbClr val="000000"/>
-              </a:solidFill>
-              <a:latin typeface="Arial"/>
-            </a:endParaRPr>
-          </a:p>
-          <a:p>
-            <a:pPr lvl="2" marL="1296000" indent="-288000">
-              <a:spcBef>
-                <a:spcPts val="850"/>
-              </a:spcBef>
-              <a:buClr>
-                <a:srgbClr val="000000"/>
-              </a:buClr>
-              <a:buSzPct val="45000"/>
-              <a:buFont typeface="Wingdings" charset="2"/>
-              <a:buChar char=""/>
-            </a:pPr>
-            <a:r>
-              <a:rPr b="0" lang="en-US" sz="2400" spc="-1" strike="noStrike">
-                <a:solidFill>
-                  <a:srgbClr val="000000"/>
-                </a:solidFill>
-                <a:latin typeface="Arial"/>
-              </a:rPr>
-              <a:t>Third Outline Level</a:t>
-            </a:r>
-            <a:endParaRPr b="0" lang="en-US" sz="2400" spc="-1" strike="noStrike">
-              <a:solidFill>
-                <a:srgbClr val="000000"/>
-              </a:solidFill>
-              <a:latin typeface="Arial"/>
-            </a:endParaRPr>
-          </a:p>
-          <a:p>
-            <a:pPr lvl="3" marL="1728000" indent="-216000">
-              <a:spcBef>
-                <a:spcPts val="567"/>
-              </a:spcBef>
-              <a:buClr>
-                <a:srgbClr val="000000"/>
-              </a:buClr>
-              <a:buSzPct val="75000"/>
-              <a:buFont typeface="Symbol" charset="2"/>
-              <a:buChar char=""/>
-            </a:pPr>
-            <a:r>
-              <a:rPr b="0" lang="en-US" sz="2000" spc="-1" strike="noStrike">
-                <a:solidFill>
-                  <a:srgbClr val="000000"/>
-                </a:solidFill>
-                <a:latin typeface="Arial"/>
-              </a:rPr>
-              <a:t>Fourth Outline Level</a:t>
-            </a:r>
-            <a:endParaRPr b="0" lang="en-US" sz="2000" spc="-1" strike="noStrike">
-              <a:solidFill>
-                <a:srgbClr val="000000"/>
-              </a:solidFill>
-              <a:latin typeface="Arial"/>
-            </a:endParaRPr>
-          </a:p>
-          <a:p>
-            <a:pPr lvl="4" marL="2160000" indent="-216000">
-              <a:spcBef>
-                <a:spcPts val="283"/>
-              </a:spcBef>
-              <a:buClr>
-                <a:srgbClr val="000000"/>
-              </a:buClr>
-              <a:buSzPct val="45000"/>
-              <a:buFont typeface="Wingdings" charset="2"/>
-              <a:buChar char=""/>
-            </a:pPr>
-            <a:r>
-              <a:rPr b="0" lang="en-US" sz="2000" spc="-1" strike="noStrike">
-                <a:solidFill>
-                  <a:srgbClr val="000000"/>
-                </a:solidFill>
-                <a:latin typeface="Arial"/>
-              </a:rPr>
-              <a:t>Fifth Outline Level</a:t>
-            </a:r>
-            <a:endParaRPr b="0" lang="en-US" sz="2000" spc="-1" strike="noStrike">
-              <a:solidFill>
-                <a:srgbClr val="000000"/>
-              </a:solidFill>
-              <a:latin typeface="Arial"/>
-            </a:endParaRPr>
-          </a:p>
-          <a:p>
-            <a:pPr lvl="5" marL="2592000" indent="-216000">
-              <a:spcBef>
-                <a:spcPts val="283"/>
-              </a:spcBef>
-              <a:buClr>
-                <a:srgbClr val="000000"/>
-              </a:buClr>
-              <a:buSzPct val="45000"/>
-              <a:buFont typeface="Wingdings" charset="2"/>
-              <a:buChar char=""/>
-            </a:pPr>
-            <a:r>
-              <a:rPr b="0" lang="en-US" sz="2000" spc="-1" strike="noStrike">
-                <a:solidFill>
-                  <a:srgbClr val="000000"/>
-                </a:solidFill>
-                <a:latin typeface="Arial"/>
-              </a:rPr>
-              <a:t>Sixth Outline Level</a:t>
-            </a:r>
-            <a:endParaRPr b="0" lang="en-US" sz="2000" spc="-1" strike="noStrike">
-              <a:solidFill>
-                <a:srgbClr val="000000"/>
-              </a:solidFill>
-              <a:latin typeface="Arial"/>
-            </a:endParaRPr>
-          </a:p>
-          <a:p>
-            <a:pPr lvl="6" marL="3024000" indent="-216000">
-              <a:spcBef>
-                <a:spcPts val="283"/>
-              </a:spcBef>
-              <a:buClr>
-                <a:srgbClr val="000000"/>
-              </a:buClr>
-              <a:buSzPct val="45000"/>
-              <a:buFont typeface="Wingdings" charset="2"/>
-              <a:buChar char=""/>
-            </a:pPr>
-            <a:r>
-              <a:rPr b="0" lang="en-US" sz="2000" spc="-1" strike="noStrike">
-                <a:solidFill>
-                  <a:srgbClr val="000000"/>
-                </a:solidFill>
-                <a:latin typeface="Arial"/>
-              </a:rPr>
-              <a:t>Seventh Outline Level</a:t>
-            </a:r>
-            <a:endParaRPr b="0" lang="en-US" sz="2000" spc="-1" strike="noStrike">
-              <a:solidFill>
-                <a:srgbClr val="000000"/>
-              </a:solidFill>
-              <a:latin typeface="Arial"/>
             </a:endParaRPr>
           </a:p>
         </p:txBody>
@@ -2005,7 +1506,7 @@
       </p:grpSpPr>
       <p:sp>
         <p:nvSpPr>
-          <p:cNvPr id="18" name="PlaceHolder 1"/>
+          <p:cNvPr id="15" name="PlaceHolder 1"/>
           <p:cNvSpPr>
             <a:spLocks noGrp="1"/>
           </p:cNvSpPr>
@@ -2016,7 +1517,7 @@
         <p:spPr>
           <a:xfrm>
             <a:off x="3447360" y="5165280"/>
-            <a:ext cx="3194640" cy="390240"/>
+            <a:ext cx="3194280" cy="389880"/>
           </a:xfrm>
           <a:prstGeom prst="rect">
             <a:avLst/>
@@ -2077,7 +1578,7 @@
       </p:sp>
       <p:sp>
         <p:nvSpPr>
-          <p:cNvPr id="19" name="PlaceHolder 2"/>
+          <p:cNvPr id="16" name="PlaceHolder 2"/>
           <p:cNvSpPr>
             <a:spLocks noGrp="1"/>
           </p:cNvSpPr>
@@ -2088,7 +1589,7 @@
         <p:spPr>
           <a:xfrm>
             <a:off x="7227360" y="5165280"/>
-            <a:ext cx="2347920" cy="390240"/>
+            <a:ext cx="2347560" cy="389880"/>
           </a:xfrm>
           <a:prstGeom prst="rect">
             <a:avLst/>
@@ -2129,7 +1630,7 @@
                 <a:tab algn="l" pos="0"/>
               </a:tabLst>
             </a:pPr>
-            <a:fld id="{D208031C-100E-4C80-8051-D28539938E6C}" type="slidenum">
+            <a:fld id="{2977E9D9-0128-40C0-904A-D14C1D8B4B31}" type="slidenum">
               <a:rPr b="0" lang="en-US" sz="1400" spc="-1" strike="noStrike">
                 <a:solidFill>
                   <a:srgbClr val="000000"/>
@@ -2149,7 +1650,7 @@
       </p:sp>
       <p:sp>
         <p:nvSpPr>
-          <p:cNvPr id="20" name="PlaceHolder 3"/>
+          <p:cNvPr id="17" name="PlaceHolder 3"/>
           <p:cNvSpPr>
             <a:spLocks noGrp="1"/>
           </p:cNvSpPr>
@@ -2160,7 +1661,7 @@
         <p:spPr>
           <a:xfrm>
             <a:off x="504000" y="5165280"/>
-            <a:ext cx="2347920" cy="390240"/>
+            <a:ext cx="2347560" cy="389880"/>
           </a:xfrm>
           <a:prstGeom prst="rect">
             <a:avLst/>
@@ -2209,7 +1710,7 @@
       </p:sp>
       <p:sp>
         <p:nvSpPr>
-          <p:cNvPr id="21" name="PlaceHolder 4"/>
+          <p:cNvPr id="18" name="PlaceHolder 4"/>
           <p:cNvSpPr>
             <a:spLocks noGrp="1"/>
           </p:cNvSpPr>
@@ -2258,7 +1759,7 @@
       </p:sp>
       <p:sp>
         <p:nvSpPr>
-          <p:cNvPr id="22" name="PlaceHolder 5"/>
+          <p:cNvPr id="19" name="PlaceHolder 5"/>
           <p:cNvSpPr>
             <a:spLocks noGrp="1"/>
           </p:cNvSpPr>
@@ -2509,7 +2010,7 @@
       </p:grpSpPr>
       <p:sp>
         <p:nvSpPr>
-          <p:cNvPr id="23" name="PlaceHolder 1"/>
+          <p:cNvPr id="20" name="PlaceHolder 1"/>
           <p:cNvSpPr>
             <a:spLocks noGrp="1"/>
           </p:cNvSpPr>
@@ -2520,7 +2021,7 @@
         <p:spPr>
           <a:xfrm>
             <a:off x="504000" y="226080"/>
-            <a:ext cx="9071280" cy="4388040"/>
+            <a:ext cx="9070920" cy="4387680"/>
           </a:xfrm>
           <a:prstGeom prst="rect">
             <a:avLst/>
@@ -2639,7 +2140,7 @@
       </p:sp>
       <p:pic>
         <p:nvPicPr>
-          <p:cNvPr id="24" name="" descr=""/>
+          <p:cNvPr id="21" name="" descr=""/>
           <p:cNvPicPr/>
           <p:nvPr/>
         </p:nvPicPr>
@@ -2650,7 +2151,7 @@
         <p:spPr>
           <a:xfrm>
             <a:off x="0" y="0"/>
-            <a:ext cx="1549440" cy="574200"/>
+            <a:ext cx="1549080" cy="573840"/>
           </a:xfrm>
           <a:prstGeom prst="rect">
             <a:avLst/>
@@ -2662,7 +2163,7 @@
       </p:pic>
       <p:pic>
         <p:nvPicPr>
-          <p:cNvPr id="25" name="" descr=""/>
+          <p:cNvPr id="22" name="" descr=""/>
           <p:cNvPicPr/>
           <p:nvPr/>
         </p:nvPicPr>
@@ -2673,7 +2174,7 @@
         <p:spPr>
           <a:xfrm>
             <a:off x="9035280" y="0"/>
-            <a:ext cx="1044360" cy="574200"/>
+            <a:ext cx="1044000" cy="573840"/>
           </a:xfrm>
           <a:prstGeom prst="rect">
             <a:avLst/>
@@ -2715,7 +2216,7 @@
       </p:grpSpPr>
       <p:sp>
         <p:nvSpPr>
-          <p:cNvPr id="26" name="PlaceHolder 1"/>
+          <p:cNvPr id="23" name="PlaceHolder 1"/>
           <p:cNvSpPr>
             <a:spLocks noGrp="1"/>
           </p:cNvSpPr>
@@ -2726,7 +2227,7 @@
         <p:spPr>
           <a:xfrm>
             <a:off x="504000" y="226080"/>
-            <a:ext cx="9071280" cy="946080"/>
+            <a:ext cx="9070920" cy="945720"/>
           </a:xfrm>
           <a:prstGeom prst="rect">
             <a:avLst/>
@@ -2770,7 +2271,7 @@
       </p:sp>
       <p:sp>
         <p:nvSpPr>
-          <p:cNvPr id="27" name="PlaceHolder 2"/>
+          <p:cNvPr id="24" name="PlaceHolder 2"/>
           <p:cNvSpPr>
             <a:spLocks noGrp="1"/>
           </p:cNvSpPr>
@@ -2781,7 +2282,7 @@
         <p:spPr>
           <a:xfrm>
             <a:off x="504000" y="1326600"/>
-            <a:ext cx="9071280" cy="3287880"/>
+            <a:ext cx="9070920" cy="3287520"/>
           </a:xfrm>
           <a:prstGeom prst="rect">
             <a:avLst/>
@@ -2793,7 +2294,7 @@
         </p:spPr>
         <p:txBody>
           <a:bodyPr lIns="0" rIns="0" tIns="0" bIns="0" anchor="t">
-            <a:normAutofit fontScale="41666"/>
+            <a:normAutofit fontScale="37222" lnSpcReduction="10000"/>
           </a:bodyPr>
           <a:p>
             <a:pPr marL="432000" indent="-324000">
@@ -2817,7 +2318,16 @@
                 </a:solidFill>
                 <a:latin typeface="Arial"/>
               </a:rPr>
-              <a:t>Accept EHR product IG family and the canonical hl7.ehrs.&lt;realm&gt;.&lt;FM/FP&gt;</a:t>
+              <a:t>Accept EHR product IG family and the </a:t>
+            </a:r>
+            <a:r>
+              <a:rPr b="0" lang="en-US" sz="3200" spc="-1" strike="noStrike">
+                <a:solidFill>
+                  <a:srgbClr val="000000"/>
+                </a:solidFill>
+                <a:latin typeface="Arial"/>
+              </a:rPr>
+              <a:t>canonical hl7.ehrs.&lt;realm&gt;.&lt;FM/FP&gt; @TSC</a:t>
             </a:r>
             <a:endParaRPr b="0" lang="en-US" sz="3200" spc="-1" strike="noStrike">
               <a:solidFill>
@@ -2848,7 +2358,16 @@
                 </a:solidFill>
                 <a:latin typeface="Arial"/>
               </a:rPr>
-              <a:t>EHR IG logo requirements?</a:t>
+              <a:t>EHR IG logo requirements? @Marketing &amp; </a:t>
+            </a:r>
+            <a:r>
+              <a:rPr b="0" lang="en-US" sz="3200" spc="-1" strike="noStrike">
+                <a:solidFill>
+                  <a:srgbClr val="000000"/>
+                </a:solidFill>
+                <a:latin typeface="Arial"/>
+              </a:rPr>
+              <a:t>Design</a:t>
             </a:r>
             <a:endParaRPr b="0" lang="en-US" sz="3200" spc="-1" strike="noStrike">
               <a:solidFill>
@@ -2879,7 +2398,16 @@
                 </a:solidFill>
                 <a:latin typeface="Arial"/>
               </a:rPr>
-              <a:t>Publish EHR IG template so it is reusable for all FM and FP</a:t>
+              <a:t>Publish EHR IG template so it is reusable for all FM </a:t>
+            </a:r>
+            <a:r>
+              <a:rPr b="0" lang="en-US" sz="2800" spc="-1" strike="noStrike">
+                <a:solidFill>
+                  <a:srgbClr val="000000"/>
+                </a:solidFill>
+                <a:latin typeface="Arial"/>
+              </a:rPr>
+              <a:t>and FP @FHIR-I</a:t>
             </a:r>
             <a:endParaRPr b="0" lang="en-US" sz="2800" spc="-1" strike="noStrike">
               <a:solidFill>
@@ -2910,7 +2438,25 @@
                 </a:solidFill>
                 <a:latin typeface="Arial"/>
               </a:rPr>
-              <a:t>When can I mark IG as Normative? Initially they are only migrations of already Normative content.</a:t>
+              <a:t>When can I mark IG as Normative? Initially they </a:t>
+            </a:r>
+            <a:r>
+              <a:rPr b="0" lang="en-US" sz="3200" spc="-1" strike="noStrike">
+                <a:solidFill>
+                  <a:srgbClr val="000000"/>
+                </a:solidFill>
+                <a:latin typeface="Arial"/>
+              </a:rPr>
+              <a:t>are only migrations of already Normative </a:t>
+            </a:r>
+            <a:r>
+              <a:rPr b="0" lang="en-US" sz="3200" spc="-1" strike="noStrike">
+                <a:solidFill>
+                  <a:srgbClr val="000000"/>
+                </a:solidFill>
+                <a:latin typeface="Arial"/>
+              </a:rPr>
+              <a:t>content. @TSC</a:t>
             </a:r>
             <a:endParaRPr b="0" lang="en-US" sz="3200" spc="-1" strike="noStrike">
               <a:solidFill>
@@ -2941,7 +2487,25 @@
                 </a:solidFill>
                 <a:latin typeface="Arial"/>
               </a:rPr>
-              <a:t>IG preprocessor options – node script to convert the max source file to IG Artifacts (mainly Requirements)</a:t>
+              <a:t>IG preprocessor options – node script to </a:t>
+            </a:r>
+            <a:r>
+              <a:rPr b="0" lang="en-US" sz="3200" spc="-1" strike="noStrike">
+                <a:solidFill>
+                  <a:srgbClr val="000000"/>
+                </a:solidFill>
+                <a:latin typeface="Arial"/>
+              </a:rPr>
+              <a:t>convert the max source file to IG Artifacts </a:t>
+            </a:r>
+            <a:r>
+              <a:rPr b="0" lang="en-US" sz="3200" spc="-1" strike="noStrike">
+                <a:solidFill>
+                  <a:srgbClr val="000000"/>
+                </a:solidFill>
+                <a:latin typeface="Arial"/>
+              </a:rPr>
+              <a:t>(mainly Requirements)</a:t>
             </a:r>
             <a:endParaRPr b="0" lang="en-US" sz="3200" spc="-1" strike="noStrike">
               <a:solidFill>
@@ -2972,7 +2536,7 @@
                 </a:solidFill>
                 <a:latin typeface="Arial"/>
               </a:rPr>
-              <a:t>GitHub Action - not enabled on HL7 repo</a:t>
+              <a:t>Local generate and add to git repo</a:t>
             </a:r>
             <a:endParaRPr b="0" lang="en-US" sz="2800" spc="-1" strike="noStrike">
               <a:solidFill>
@@ -2997,13 +2561,84 @@
               <a:buChar char=""/>
             </a:pPr>
             <a:r>
-              <a:rPr b="0" lang="en-US" sz="2800" spc="-1" strike="noStrike">
+              <a:rPr b="1" lang="en-US" sz="2800" spc="-1" strike="noStrike">
                 <a:solidFill>
                   <a:srgbClr val="000000"/>
                 </a:solidFill>
                 <a:latin typeface="Arial"/>
               </a:rPr>
-              <a:t>Hook in template in ant file? (noticed this use in UTG IG)</a:t>
+              <a:t>Spreadsheet like editing .. build on FSH?</a:t>
+            </a:r>
+            <a:endParaRPr b="0" lang="en-US" sz="2800" spc="-1" strike="noStrike">
+              <a:solidFill>
+                <a:srgbClr val="000000"/>
+              </a:solidFill>
+              <a:latin typeface="Arial"/>
+            </a:endParaRPr>
+          </a:p>
+          <a:p>
+            <a:pPr lvl="1" marL="864000" indent="-324000">
+              <a:lnSpc>
+                <a:spcPct val="100000"/>
+              </a:lnSpc>
+              <a:spcBef>
+                <a:spcPts val="1134"/>
+              </a:spcBef>
+              <a:buClr>
+                <a:srgbClr val="000000"/>
+              </a:buClr>
+              <a:buSzPct val="75000"/>
+              <a:buFont typeface="Symbol" charset="2"/>
+              <a:buChar char=""/>
+            </a:pPr>
+            <a:r>
+              <a:rPr b="0" lang="en-US" sz="2800" spc="-1" strike="noStrike">
+                <a:solidFill>
+                  <a:srgbClr val="000000"/>
+                </a:solidFill>
+                <a:latin typeface="Arial"/>
+              </a:rPr>
+              <a:t>GitHub Action - not enabled on HL7 git repo</a:t>
+            </a:r>
+            <a:endParaRPr b="0" lang="en-US" sz="2800" spc="-1" strike="noStrike">
+              <a:solidFill>
+                <a:srgbClr val="000000"/>
+              </a:solidFill>
+              <a:latin typeface="Arial"/>
+            </a:endParaRPr>
+          </a:p>
+          <a:p>
+            <a:pPr lvl="1" marL="864000" indent="-324000">
+              <a:lnSpc>
+                <a:spcPct val="100000"/>
+              </a:lnSpc>
+              <a:spcBef>
+                <a:spcPts val="1134"/>
+              </a:spcBef>
+              <a:buClr>
+                <a:srgbClr val="000000"/>
+              </a:buClr>
+              <a:buSzPct val="75000"/>
+              <a:buFont typeface="Symbol" charset="2"/>
+              <a:buChar char=""/>
+            </a:pPr>
+            <a:r>
+              <a:rPr b="0" lang="en-US" sz="2800" spc="-1" strike="noStrike">
+                <a:solidFill>
+                  <a:srgbClr val="000000"/>
+                </a:solidFill>
+                <a:latin typeface="Arial"/>
+              </a:rPr>
+              <a:t>Hook in template in ant file? (noticed this use in </a:t>
+            </a:r>
+            <a:r>
+              <a:rPr b="0" lang="en-US" sz="2800" spc="-1" strike="noStrike">
+                <a:solidFill>
+                  <a:srgbClr val="000000"/>
+                </a:solidFill>
+                <a:latin typeface="Arial"/>
+              </a:rPr>
+              <a:t>UTG IG)</a:t>
             </a:r>
             <a:endParaRPr b="0" lang="en-US" sz="2800" spc="-1" strike="noStrike">
               <a:solidFill>
@@ -3076,7 +2711,34 @@
                 </a:solidFill>
                 <a:latin typeface="Arial"/>
               </a:rPr>
-              <a:t>Next step: convert a Functional Profile that uses Requirements.derivedFrom and Requirements.statement.derivedFrom and write the validation rules for that...</a:t>
+              <a:t>Next step: convert a Functional Profile that </a:t>
+            </a:r>
+            <a:r>
+              <a:rPr b="0" i="1" lang="en-US" sz="3200" spc="-1" strike="noStrike">
+                <a:solidFill>
+                  <a:srgbClr val="000000"/>
+                </a:solidFill>
+                <a:latin typeface="Arial"/>
+              </a:rPr>
+              <a:t>uses Requirements.derivedFrom and </a:t>
+            </a:r>
+            <a:r>
+              <a:rPr b="0" i="1" lang="en-US" sz="3200" spc="-1" strike="noStrike">
+                <a:solidFill>
+                  <a:srgbClr val="000000"/>
+                </a:solidFill>
+                <a:latin typeface="Arial"/>
+              </a:rPr>
+              <a:t>Requirements.statement.derivedFrom and write </a:t>
+            </a:r>
+            <a:r>
+              <a:rPr b="0" i="1" lang="en-US" sz="3200" spc="-1" strike="noStrike">
+                <a:solidFill>
+                  <a:srgbClr val="000000"/>
+                </a:solidFill>
+                <a:latin typeface="Arial"/>
+              </a:rPr>
+              <a:t>the validation rules for that...</a:t>
             </a:r>
             <a:endParaRPr b="0" lang="en-US" sz="3200" spc="-1" strike="noStrike">
               <a:solidFill>
@@ -3089,7 +2751,7 @@
       </p:sp>
       <p:pic>
         <p:nvPicPr>
-          <p:cNvPr id="28" name="" descr=""/>
+          <p:cNvPr id="25" name="" descr=""/>
           <p:cNvPicPr/>
           <p:nvPr/>
         </p:nvPicPr>
@@ -3100,7 +2762,7 @@
         <p:spPr>
           <a:xfrm>
             <a:off x="0" y="0"/>
-            <a:ext cx="1549440" cy="574200"/>
+            <a:ext cx="1549080" cy="573840"/>
           </a:xfrm>
           <a:prstGeom prst="rect">
             <a:avLst/>
@@ -3112,7 +2774,7 @@
       </p:pic>
       <p:pic>
         <p:nvPicPr>
-          <p:cNvPr id="29" name="" descr=""/>
+          <p:cNvPr id="26" name="" descr=""/>
           <p:cNvPicPr/>
           <p:nvPr/>
         </p:nvPicPr>
@@ -3123,7 +2785,7 @@
         <p:spPr>
           <a:xfrm>
             <a:off x="9035280" y="0"/>
-            <a:ext cx="1044360" cy="574200"/>
+            <a:ext cx="1044000" cy="573840"/>
           </a:xfrm>
           <a:prstGeom prst="rect">
             <a:avLst/>
@@ -3165,7 +2827,7 @@
       </p:grpSpPr>
       <p:sp>
         <p:nvSpPr>
-          <p:cNvPr id="30" name="PlaceHolder 1"/>
+          <p:cNvPr id="27" name="PlaceHolder 1"/>
           <p:cNvSpPr>
             <a:spLocks noGrp="1"/>
           </p:cNvSpPr>
@@ -3176,7 +2838,7 @@
         <p:spPr>
           <a:xfrm>
             <a:off x="504000" y="74160"/>
-            <a:ext cx="9071280" cy="1249920"/>
+            <a:ext cx="9070920" cy="1249560"/>
           </a:xfrm>
           <a:prstGeom prst="rect">
             <a:avLst/>
@@ -3232,7 +2894,7 @@
       </p:sp>
       <p:sp>
         <p:nvSpPr>
-          <p:cNvPr id="31" name="PlaceHolder 2"/>
+          <p:cNvPr id="28" name="PlaceHolder 2"/>
           <p:cNvSpPr>
             <a:spLocks noGrp="1"/>
           </p:cNvSpPr>
@@ -3243,7 +2905,7 @@
         <p:spPr>
           <a:xfrm>
             <a:off x="518040" y="1451880"/>
-            <a:ext cx="9071280" cy="3287880"/>
+            <a:ext cx="9070920" cy="3287520"/>
           </a:xfrm>
           <a:prstGeom prst="rect">
             <a:avLst/>
@@ -3310,7 +2972,7 @@
                 </a:solidFill>
                 <a:latin typeface="Arial"/>
               </a:rPr>
-              <a:t>Family: ehrs</a:t>
+              <a:t>Family: ehr</a:t>
             </a:r>
             <a:endParaRPr b="0" lang="en-US" sz="2800" spc="-1" strike="noStrike">
               <a:solidFill>
@@ -3448,7 +3110,7 @@
       </p:sp>
       <p:pic>
         <p:nvPicPr>
-          <p:cNvPr id="32" name="" descr=""/>
+          <p:cNvPr id="29" name="" descr=""/>
           <p:cNvPicPr/>
           <p:nvPr/>
         </p:nvPicPr>
@@ -3459,7 +3121,7 @@
         <p:spPr>
           <a:xfrm>
             <a:off x="0" y="0"/>
-            <a:ext cx="1549440" cy="574200"/>
+            <a:ext cx="1549080" cy="573840"/>
           </a:xfrm>
           <a:prstGeom prst="rect">
             <a:avLst/>
@@ -3471,7 +3133,7 @@
       </p:pic>
       <p:pic>
         <p:nvPicPr>
-          <p:cNvPr id="33" name="" descr=""/>
+          <p:cNvPr id="30" name="" descr=""/>
           <p:cNvPicPr/>
           <p:nvPr/>
         </p:nvPicPr>
@@ -3482,7 +3144,7 @@
         <p:spPr>
           <a:xfrm>
             <a:off x="9035280" y="0"/>
-            <a:ext cx="1044360" cy="574200"/>
+            <a:ext cx="1044000" cy="573840"/>
           </a:xfrm>
           <a:prstGeom prst="rect">
             <a:avLst/>
@@ -3524,7 +3186,7 @@
       </p:grpSpPr>
       <p:sp>
         <p:nvSpPr>
-          <p:cNvPr id="34" name="PlaceHolder 1"/>
+          <p:cNvPr id="31" name="PlaceHolder 1"/>
           <p:cNvSpPr>
             <a:spLocks noGrp="1"/>
           </p:cNvSpPr>
@@ -3535,7 +3197,7 @@
         <p:spPr>
           <a:xfrm>
             <a:off x="504000" y="226080"/>
-            <a:ext cx="9071280" cy="946080"/>
+            <a:ext cx="9070920" cy="945720"/>
           </a:xfrm>
           <a:prstGeom prst="rect">
             <a:avLst/>
@@ -3566,7 +3228,7 @@
                 </a:solidFill>
                 <a:latin typeface="Arial"/>
               </a:rPr>
-              <a:t>Examples (with EHRS family)</a:t>
+              <a:t>Examples (with EHR family)</a:t>
             </a:r>
             <a:endParaRPr b="0" lang="en-US" sz="4400" spc="-1" strike="noStrike">
               <a:solidFill>
@@ -3579,7 +3241,7 @@
       </p:sp>
       <p:pic>
         <p:nvPicPr>
-          <p:cNvPr id="35" name="" descr=""/>
+          <p:cNvPr id="32" name="" descr=""/>
           <p:cNvPicPr/>
           <p:nvPr/>
         </p:nvPicPr>
@@ -3590,7 +3252,7 @@
         <p:spPr>
           <a:xfrm>
             <a:off x="0" y="0"/>
-            <a:ext cx="1549440" cy="574200"/>
+            <a:ext cx="1549080" cy="573840"/>
           </a:xfrm>
           <a:prstGeom prst="rect">
             <a:avLst/>
@@ -3602,7 +3264,7 @@
       </p:pic>
       <p:pic>
         <p:nvPicPr>
-          <p:cNvPr id="36" name="" descr=""/>
+          <p:cNvPr id="33" name="" descr=""/>
           <p:cNvPicPr/>
           <p:nvPr/>
         </p:nvPicPr>
@@ -3613,7 +3275,7 @@
         <p:spPr>
           <a:xfrm>
             <a:off x="9035280" y="0"/>
-            <a:ext cx="1044360" cy="574200"/>
+            <a:ext cx="1044000" cy="573840"/>
           </a:xfrm>
           <a:prstGeom prst="rect">
             <a:avLst/>
@@ -3625,7 +3287,7 @@
       </p:pic>
       <p:graphicFrame>
         <p:nvGraphicFramePr>
-          <p:cNvPr id="37" name=""/>
+          <p:cNvPr id="34" name=""/>
           <p:cNvGraphicFramePr/>
           <p:nvPr/>
         </p:nvGraphicFramePr>
@@ -3948,7 +3610,7 @@
                           </a:highlight>
                           <a:latin typeface="Arial"/>
                         </a:rPr>
-                        <a:t>ehrs</a:t>
+                        <a:t>ehr</a:t>
                       </a:r>
                       <a:r>
                         <a:rPr b="0" lang="en-US" sz="1800" spc="-1" strike="noStrike">
@@ -4281,7 +3943,7 @@
                           </a:highlight>
                           <a:latin typeface="Arial"/>
                         </a:rPr>
-                        <a:t>ehrs</a:t>
+                        <a:t>ehr</a:t>
                       </a:r>
                       <a:r>
                         <a:rPr b="0" lang="en-US" sz="1800" spc="-1" strike="noStrike">
@@ -4476,7 +4138,7 @@
                           </a:highlight>
                           <a:latin typeface="Arial"/>
                         </a:rPr>
-                        <a:t>ehrs</a:t>
+                        <a:t>ehr</a:t>
                       </a:r>
                       <a:r>
                         <a:rPr b="0" lang="en-US" sz="1800" spc="-1" strike="noStrike">
@@ -4821,7 +4483,7 @@
                           </a:highlight>
                           <a:latin typeface="Arial"/>
                         </a:rPr>
-                        <a:t>ehrs</a:t>
+                        <a:t>ehr</a:t>
                       </a:r>
                       <a:r>
                         <a:rPr b="0" lang="en-US" sz="1800" spc="-1" strike="noStrike">
@@ -5014,7 +4676,7 @@
                           </a:highlight>
                           <a:latin typeface="Arial"/>
                         </a:rPr>
-                        <a:t>ehrs</a:t>
+                        <a:t>ehr</a:t>
                       </a:r>
                       <a:r>
                         <a:rPr b="0" lang="en-US" sz="1800" spc="-1" strike="noStrike">
@@ -5347,7 +5009,7 @@
                           </a:highlight>
                           <a:latin typeface="Arial"/>
                         </a:rPr>
-                        <a:t>ehrs</a:t>
+                        <a:t>ehr</a:t>
                       </a:r>
                       <a:r>
                         <a:rPr b="0" lang="en-US" sz="1800" spc="-1" strike="noStrike">
@@ -5524,7 +5186,7 @@
                           </a:highlight>
                           <a:latin typeface="Arial"/>
                         </a:rPr>
-                        <a:t>ehrs</a:t>
+                        <a:t>ehr</a:t>
                       </a:r>
                       <a:r>
                         <a:rPr b="0" lang="en-US" sz="1800" spc="-1" strike="noStrike">
@@ -5608,7 +5270,7 @@
       </p:grpSpPr>
       <p:sp>
         <p:nvSpPr>
-          <p:cNvPr id="38" name="PlaceHolder 1"/>
+          <p:cNvPr id="35" name="PlaceHolder 1"/>
           <p:cNvSpPr>
             <a:spLocks noGrp="1"/>
           </p:cNvSpPr>
@@ -5619,7 +5281,7 @@
         <p:spPr>
           <a:xfrm>
             <a:off x="504000" y="226080"/>
-            <a:ext cx="9071280" cy="946080"/>
+            <a:ext cx="9070920" cy="945720"/>
           </a:xfrm>
           <a:prstGeom prst="rect">
             <a:avLst/>
@@ -5663,7 +5325,7 @@
       </p:sp>
       <p:pic>
         <p:nvPicPr>
-          <p:cNvPr id="39" name="" descr=""/>
+          <p:cNvPr id="36" name="" descr=""/>
           <p:cNvPicPr/>
           <p:nvPr/>
         </p:nvPicPr>
@@ -5674,7 +5336,7 @@
         <p:spPr>
           <a:xfrm>
             <a:off x="0" y="0"/>
-            <a:ext cx="1549440" cy="574200"/>
+            <a:ext cx="1549080" cy="573840"/>
           </a:xfrm>
           <a:prstGeom prst="rect">
             <a:avLst/>
@@ -5686,7 +5348,7 @@
       </p:pic>
       <p:pic>
         <p:nvPicPr>
-          <p:cNvPr id="40" name="" descr=""/>
+          <p:cNvPr id="37" name="" descr=""/>
           <p:cNvPicPr/>
           <p:nvPr/>
         </p:nvPicPr>
@@ -5697,7 +5359,7 @@
         <p:spPr>
           <a:xfrm>
             <a:off x="9035280" y="0"/>
-            <a:ext cx="1044360" cy="574200"/>
+            <a:ext cx="1044000" cy="573840"/>
           </a:xfrm>
           <a:prstGeom prst="rect">
             <a:avLst/>
@@ -5709,7 +5371,7 @@
       </p:pic>
       <p:graphicFrame>
         <p:nvGraphicFramePr>
-          <p:cNvPr id="41" name=""/>
+          <p:cNvPr id="38" name=""/>
           <p:cNvGraphicFramePr/>
           <p:nvPr/>
         </p:nvGraphicFramePr>

</xml_diff>